<commit_message>
Updated Fall 2020 slides
</commit_message>
<xml_diff>
--- a/Fall_2020/03-Overview_of_Query_Processing.pptx
+++ b/Fall_2020/03-Overview_of_Query_Processing.pptx
@@ -4310,7 +4310,7 @@
               <a:pPr>
                 <a:defRPr/>
               </a:pPr>
-              <a:t>2019/10/8</a:t>
+              <a:t>2020/10/14</a:t>
             </a:fld>
             <a:endParaRPr lang="zh-CN" altLang="en-US"/>
           </a:p>
@@ -5174,7 +5174,7 @@
               <a:pPr>
                 <a:defRPr/>
               </a:pPr>
-              <a:t>2019/10/8</a:t>
+              <a:t>2020/10/14</a:t>
             </a:fld>
             <a:endParaRPr lang="zh-CN" altLang="en-US"/>
           </a:p>
@@ -5375,7 +5375,7 @@
               <a:pPr>
                 <a:defRPr/>
               </a:pPr>
-              <a:t>2019/10/8</a:t>
+              <a:t>2020/10/14</a:t>
             </a:fld>
             <a:endParaRPr lang="zh-CN" altLang="en-US"/>
           </a:p>
@@ -5585,7 +5585,7 @@
               <a:pPr>
                 <a:defRPr/>
               </a:pPr>
-              <a:t>2019/10/8</a:t>
+              <a:t>2020/10/14</a:t>
             </a:fld>
             <a:endParaRPr lang="zh-CN" altLang="en-US"/>
           </a:p>
@@ -5785,7 +5785,7 @@
               <a:pPr>
                 <a:defRPr/>
               </a:pPr>
-              <a:t>2019/10/8</a:t>
+              <a:t>2020/10/14</a:t>
             </a:fld>
             <a:endParaRPr lang="zh-CN" altLang="en-US"/>
           </a:p>
@@ -6308,7 +6308,7 @@
               <a:pPr>
                 <a:defRPr/>
               </a:pPr>
-              <a:t>2019/10/8</a:t>
+              <a:t>2020/10/14</a:t>
             </a:fld>
             <a:endParaRPr lang="zh-CN" altLang="en-US"/>
           </a:p>
@@ -6608,7 +6608,7 @@
               <a:pPr>
                 <a:defRPr/>
               </a:pPr>
-              <a:t>2019/10/8</a:t>
+              <a:t>2020/10/14</a:t>
             </a:fld>
             <a:endParaRPr lang="zh-CN" altLang="en-US"/>
           </a:p>
@@ -7123,7 +7123,7 @@
               <a:pPr>
                 <a:defRPr/>
               </a:pPr>
-              <a:t>2019/10/8</a:t>
+              <a:t>2020/10/14</a:t>
             </a:fld>
             <a:endParaRPr lang="zh-CN" altLang="en-US"/>
           </a:p>
@@ -7275,7 +7275,7 @@
               <a:pPr>
                 <a:defRPr/>
               </a:pPr>
-              <a:t>2019/10/8</a:t>
+              <a:t>2020/10/14</a:t>
             </a:fld>
             <a:endParaRPr lang="zh-CN" altLang="en-US"/>
           </a:p>
@@ -7520,7 +7520,7 @@
               <a:pPr>
                 <a:defRPr/>
               </a:pPr>
-              <a:t>2019/10/8</a:t>
+              <a:t>2020/10/14</a:t>
             </a:fld>
             <a:endParaRPr lang="zh-CN" altLang="en-US"/>
           </a:p>
@@ -7813,7 +7813,7 @@
               <a:pPr>
                 <a:defRPr/>
               </a:pPr>
-              <a:t>2019/10/8</a:t>
+              <a:t>2020/10/14</a:t>
             </a:fld>
             <a:endParaRPr lang="zh-CN" altLang="en-US"/>
           </a:p>
@@ -8280,7 +8280,7 @@
               <a:pPr>
                 <a:defRPr/>
               </a:pPr>
-              <a:t>2019/10/8</a:t>
+              <a:t>2020/10/14</a:t>
             </a:fld>
             <a:endParaRPr lang="zh-CN" altLang="en-US"/>
           </a:p>
@@ -8847,7 +8847,7 @@
               <a:pPr>
                 <a:defRPr/>
               </a:pPr>
-              <a:t>2019/10/8</a:t>
+              <a:t>2020/10/14</a:t>
             </a:fld>
             <a:endParaRPr lang="zh-CN" altLang="en-US"/>
           </a:p>
@@ -9574,7 +9574,7 @@
             </a:r>
             <a:r>
               <a:rPr lang="en-US" altLang="zh-CN" sz="2800" dirty="0" smtClean="0"/>
-              <a:t>2019</a:t>
+              <a:t>2020</a:t>
             </a:r>
             <a:endParaRPr lang="zh-CN" altLang="en-US" sz="2800" dirty="0"/>
           </a:p>
@@ -9591,7 +9591,7 @@
         <p:spPr bwMode="auto">
           <a:xfrm>
             <a:off x="1428750" y="3000375"/>
-            <a:ext cx="6929438" cy="2800350"/>
+            <a:ext cx="6929438" cy="2369880"/>
           </a:xfrm>
           <a:prstGeom prst="rect">
             <a:avLst/>
@@ -9731,34 +9731,6 @@
               </a:defRPr>
             </a:lvl9pPr>
           </a:lstStyle>
-          <a:p>
-            <a:pPr eaLnBrk="1" hangingPunct="1"/>
-            <a:r>
-              <a:rPr lang="en-US" altLang="zh-CN" sz="2800" dirty="0" smtClean="0">
-                <a:latin typeface="Gill Sans MT" charset="0"/>
-                <a:ea typeface="华文中宋" charset="-122"/>
-              </a:rPr>
-              <a:t>Chapter</a:t>
-            </a:r>
-            <a:r>
-              <a:rPr lang="zh-CN" altLang="en-US" sz="2800" dirty="0" smtClean="0">
-                <a:latin typeface="Gill Sans MT" charset="0"/>
-                <a:ea typeface="华文中宋" charset="-122"/>
-              </a:rPr>
-              <a:t> </a:t>
-            </a:r>
-            <a:r>
-              <a:rPr lang="en-US" altLang="zh-CN" sz="2800" dirty="0" smtClean="0">
-                <a:latin typeface="Gill Sans MT" charset="0"/>
-                <a:ea typeface="华文中宋" charset="-122"/>
-              </a:rPr>
-              <a:t>6</a:t>
-            </a:r>
-            <a:endParaRPr lang="en-US" altLang="zh-CN" sz="2800" dirty="0">
-              <a:latin typeface="Gill Sans MT" charset="0"/>
-              <a:ea typeface="华文中宋" charset="-122"/>
-            </a:endParaRPr>
-          </a:p>
           <a:p>
             <a:pPr eaLnBrk="1" hangingPunct="1"/>
             <a:endParaRPr lang="en-US" altLang="zh-CN" sz="2800" dirty="0" smtClean="0">
@@ -10677,7 +10649,7 @@
           <a:graphicData uri="http://schemas.openxmlformats.org/presentationml/2006/ole">
             <mc:AlternateContent xmlns:mc="http://schemas.openxmlformats.org/markup-compatibility/2006">
               <mc:Choice xmlns:v="urn:schemas-microsoft-com:vml" Requires="v">
-                <p:oleObj spid="_x0000_s4140" name="Equation" r:id="rId3" imgW="2133360" imgH="241200" progId="Equation.3">
+                <p:oleObj spid="_x0000_s4144" name="Equation" r:id="rId3" imgW="2133360" imgH="241200" progId="Equation.3">
                   <p:embed/>
                 </p:oleObj>
               </mc:Choice>
@@ -17681,7 +17653,7 @@
           <a:graphicData uri="http://schemas.openxmlformats.org/presentationml/2006/ole">
             <mc:AlternateContent xmlns:mc="http://schemas.openxmlformats.org/markup-compatibility/2006">
               <mc:Choice xmlns:v="urn:schemas-microsoft-com:vml" Requires="v">
-                <p:oleObj spid="_x0000_s5244" name="Equation" r:id="rId4" imgW="863280" imgH="203040" progId="Equation.3">
+                <p:oleObj spid="_x0000_s5250" name="Equation" r:id="rId4" imgW="863280" imgH="203040" progId="Equation.3">
                   <p:embed/>
                 </p:oleObj>
               </mc:Choice>
@@ -17776,7 +17748,7 @@
           <a:graphicData uri="http://schemas.openxmlformats.org/presentationml/2006/ole">
             <mc:AlternateContent xmlns:mc="http://schemas.openxmlformats.org/markup-compatibility/2006">
               <mc:Choice xmlns:v="urn:schemas-microsoft-com:vml" Requires="v">
-                <p:oleObj spid="_x0000_s5245" name="Equation" r:id="rId6" imgW="114120" imgH="126720" progId="Equation.3">
+                <p:oleObj spid="_x0000_s5251" name="Equation" r:id="rId6" imgW="114120" imgH="126720" progId="Equation.3">
                   <p:embed/>
                 </p:oleObj>
               </mc:Choice>
@@ -18351,7 +18323,7 @@
           <a:graphicData uri="http://schemas.openxmlformats.org/presentationml/2006/ole">
             <mc:AlternateContent xmlns:mc="http://schemas.openxmlformats.org/markup-compatibility/2006">
               <mc:Choice xmlns:v="urn:schemas-microsoft-com:vml" Requires="v">
-                <p:oleObj spid="_x0000_s6187" r:id="rId3" imgW="304800" imgH="152400" progId="Unknown">
+                <p:oleObj spid="_x0000_s6191" r:id="rId3" imgW="304800" imgH="152400" progId="Unknown">
                   <p:embed/>
                 </p:oleObj>
               </mc:Choice>
@@ -19934,7 +19906,7 @@
           <a:graphicData uri="http://schemas.openxmlformats.org/presentationml/2006/ole">
             <mc:AlternateContent xmlns:mc="http://schemas.openxmlformats.org/markup-compatibility/2006">
               <mc:Choice xmlns:v="urn:schemas-microsoft-com:vml" Requires="v">
-                <p:oleObj spid="_x0000_s1068" name="Equation" r:id="rId3" imgW="3492360" imgH="215640" progId="Equation.3">
+                <p:oleObj spid="_x0000_s1072" name="Equation" r:id="rId3" imgW="3492360" imgH="215640" progId="Equation.3">
                   <p:embed/>
                 </p:oleObj>
               </mc:Choice>
@@ -23115,7 +23087,7 @@
           <a:graphicData uri="http://schemas.openxmlformats.org/presentationml/2006/ole">
             <mc:AlternateContent xmlns:mc="http://schemas.openxmlformats.org/markup-compatibility/2006">
               <mc:Choice xmlns:v="urn:schemas-microsoft-com:vml" Requires="v">
-                <p:oleObj spid="_x0000_s3148" name="公式" r:id="rId3" imgW="2082600" imgH="241200" progId="Equation.3">
+                <p:oleObj spid="_x0000_s3154" name="公式" r:id="rId3" imgW="2082600" imgH="241200" progId="Equation.3">
                   <p:embed/>
                 </p:oleObj>
               </mc:Choice>
@@ -23210,7 +23182,7 @@
           <a:graphicData uri="http://schemas.openxmlformats.org/presentationml/2006/ole">
             <mc:AlternateContent xmlns:mc="http://schemas.openxmlformats.org/markup-compatibility/2006">
               <mc:Choice xmlns:v="urn:schemas-microsoft-com:vml" Requires="v">
-                <p:oleObj spid="_x0000_s3149" name="Equation" r:id="rId5" imgW="2425680" imgH="241200" progId="Equation.3">
+                <p:oleObj spid="_x0000_s3155" name="Equation" r:id="rId5" imgW="2425680" imgH="241200" progId="Equation.3">
                   <p:embed/>
                 </p:oleObj>
               </mc:Choice>

</xml_diff>